<commit_message>
ajout test d'intégration dans doc soutenance
</commit_message>
<xml_diff>
--- a/doc/Soutenance Projet 8.pptx
+++ b/doc/Soutenance Projet 8.pptx
@@ -312,7 +312,7 @@
           <a:p>
             <a:fld id="{2400229A-390B-4886-878D-DF4DFBA38E23}" type="datetimeFigureOut">
               <a:rPr lang="fr-FR" smtClean="0"/>
-              <a:t>20/04/2019</a:t>
+              <a:t>22/04/2019</a:t>
             </a:fld>
             <a:endParaRPr lang="fr-FR"/>
           </a:p>
@@ -477,7 +477,7 @@
           <a:p>
             <a:fld id="{2400229A-390B-4886-878D-DF4DFBA38E23}" type="datetimeFigureOut">
               <a:rPr lang="fr-FR" smtClean="0"/>
-              <a:t>20/04/2019</a:t>
+              <a:t>22/04/2019</a:t>
             </a:fld>
             <a:endParaRPr lang="fr-FR"/>
           </a:p>
@@ -652,7 +652,7 @@
           <a:p>
             <a:fld id="{2400229A-390B-4886-878D-DF4DFBA38E23}" type="datetimeFigureOut">
               <a:rPr lang="fr-FR" smtClean="0"/>
-              <a:t>20/04/2019</a:t>
+              <a:t>22/04/2019</a:t>
             </a:fld>
             <a:endParaRPr lang="fr-FR"/>
           </a:p>
@@ -817,7 +817,7 @@
           <a:p>
             <a:fld id="{2400229A-390B-4886-878D-DF4DFBA38E23}" type="datetimeFigureOut">
               <a:rPr lang="fr-FR" smtClean="0"/>
-              <a:t>20/04/2019</a:t>
+              <a:t>22/04/2019</a:t>
             </a:fld>
             <a:endParaRPr lang="fr-FR"/>
           </a:p>
@@ -1058,7 +1058,7 @@
           <a:p>
             <a:fld id="{2400229A-390B-4886-878D-DF4DFBA38E23}" type="datetimeFigureOut">
               <a:rPr lang="fr-FR" smtClean="0"/>
-              <a:t>20/04/2019</a:t>
+              <a:t>22/04/2019</a:t>
             </a:fld>
             <a:endParaRPr lang="fr-FR"/>
           </a:p>
@@ -1341,7 +1341,7 @@
           <a:p>
             <a:fld id="{2400229A-390B-4886-878D-DF4DFBA38E23}" type="datetimeFigureOut">
               <a:rPr lang="fr-FR" smtClean="0"/>
-              <a:t>20/04/2019</a:t>
+              <a:t>22/04/2019</a:t>
             </a:fld>
             <a:endParaRPr lang="fr-FR"/>
           </a:p>
@@ -1770,7 +1770,7 @@
           <a:p>
             <a:fld id="{2400229A-390B-4886-878D-DF4DFBA38E23}" type="datetimeFigureOut">
               <a:rPr lang="fr-FR" smtClean="0"/>
-              <a:t>20/04/2019</a:t>
+              <a:t>22/04/2019</a:t>
             </a:fld>
             <a:endParaRPr lang="fr-FR"/>
           </a:p>
@@ -1883,7 +1883,7 @@
           <a:p>
             <a:fld id="{2400229A-390B-4886-878D-DF4DFBA38E23}" type="datetimeFigureOut">
               <a:rPr lang="fr-FR" smtClean="0"/>
-              <a:t>20/04/2019</a:t>
+              <a:t>22/04/2019</a:t>
             </a:fld>
             <a:endParaRPr lang="fr-FR"/>
           </a:p>
@@ -1973,7 +1973,7 @@
           <a:p>
             <a:fld id="{2400229A-390B-4886-878D-DF4DFBA38E23}" type="datetimeFigureOut">
               <a:rPr lang="fr-FR" smtClean="0"/>
-              <a:t>20/04/2019</a:t>
+              <a:t>22/04/2019</a:t>
             </a:fld>
             <a:endParaRPr lang="fr-FR"/>
           </a:p>
@@ -2162,7 +2162,7 @@
           <a:p>
             <a:fld id="{2400229A-390B-4886-878D-DF4DFBA38E23}" type="datetimeFigureOut">
               <a:rPr lang="fr-FR" smtClean="0"/>
-              <a:t>20/04/2019</a:t>
+              <a:t>22/04/2019</a:t>
             </a:fld>
             <a:endParaRPr lang="fr-FR"/>
           </a:p>
@@ -2480,7 +2480,7 @@
           <a:p>
             <a:fld id="{2400229A-390B-4886-878D-DF4DFBA38E23}" type="datetimeFigureOut">
               <a:rPr lang="fr-FR" smtClean="0"/>
-              <a:t>20/04/2019</a:t>
+              <a:t>22/04/2019</a:t>
             </a:fld>
             <a:endParaRPr lang="fr-FR"/>
           </a:p>
@@ -2859,7 +2859,7 @@
           <a:p>
             <a:fld id="{2400229A-390B-4886-878D-DF4DFBA38E23}" type="datetimeFigureOut">
               <a:rPr lang="fr-FR" smtClean="0"/>
-              <a:t>20/04/2019</a:t>
+              <a:t>22/04/2019</a:t>
             </a:fld>
             <a:endParaRPr lang="fr-FR"/>
           </a:p>
@@ -3199,11 +3199,7 @@
           <a:p>
             <a:r>
               <a:rPr lang="fr-FR" dirty="0" smtClean="0"/>
-              <a:t>Soutenance Projet </a:t>
-            </a:r>
-            <a:r>
-              <a:rPr lang="fr-FR" dirty="0" smtClean="0"/>
-              <a:t>8</a:t>
+              <a:t>Soutenance Projet 8</a:t>
             </a:r>
             <a:endParaRPr lang="fr-FR" dirty="0"/>
           </a:p>
@@ -3464,8 +3460,27 @@
           <a:p>
             <a:r>
               <a:rPr lang="fr-FR" dirty="0"/>
-              <a:t>Tests de modification de la base de donnée</a:t>
-            </a:r>
+              <a:t>Tests de modification de la base de </a:t>
+            </a:r>
+            <a:r>
+              <a:rPr lang="fr-FR" dirty="0" smtClean="0"/>
+              <a:t>donnée</a:t>
+            </a:r>
+          </a:p>
+          <a:p>
+            <a:r>
+              <a:rPr lang="fr-FR" dirty="0" smtClean="0"/>
+              <a:t>Tests d’intégration (utilisation de </a:t>
+            </a:r>
+            <a:r>
+              <a:rPr lang="fr-FR" dirty="0" err="1" smtClean="0"/>
+              <a:t>Selenium</a:t>
+            </a:r>
+            <a:r>
+              <a:rPr lang="fr-FR" smtClean="0"/>
+              <a:t>)</a:t>
+            </a:r>
+            <a:endParaRPr lang="fr-FR" dirty="0"/>
           </a:p>
           <a:p>
             <a:endParaRPr lang="fr-FR" dirty="0"/>
@@ -3646,11 +3661,7 @@
           <a:p>
             <a:r>
               <a:rPr lang="fr-FR" dirty="0" smtClean="0"/>
-              <a:t>Démonstration </a:t>
-            </a:r>
-            <a:r>
-              <a:rPr lang="fr-FR" dirty="0" smtClean="0"/>
-              <a:t>de l’application</a:t>
+              <a:t>Démonstration de l’application</a:t>
             </a:r>
           </a:p>
           <a:p>
@@ -3658,7 +3669,6 @@
               <a:rPr lang="fr-FR" dirty="0" smtClean="0"/>
               <a:t>La démarche et le code</a:t>
             </a:r>
-            <a:endParaRPr lang="fr-FR" dirty="0" smtClean="0"/>
           </a:p>
           <a:p>
             <a:pPr lvl="1"/>

</xml_diff>